<commit_message>
update scheme dark theme
</commit_message>
<xml_diff>
--- a/misc/concept.pptx
+++ b/misc/concept.pptx
@@ -6,6 +6,7 @@
   </p:sldMasterIdLst>
   <p:sldIdLst>
     <p:sldId id="256" r:id="rId2"/>
+    <p:sldId id="257" r:id="rId3"/>
   </p:sldIdLst>
   <p:sldSz cx="12192000" cy="6858000"/>
   <p:notesSz cx="6858000" cy="9144000"/>
@@ -5610,6 +5611,2535 @@
 </p:sld>
 </file>
 
+<file path=ppt/slides/slide2.xml><?xml version="1.0" encoding="utf-8"?>
+<p:sld xmlns:a="http://schemas.openxmlformats.org/drawingml/2006/main" xmlns:r="http://schemas.openxmlformats.org/officeDocument/2006/relationships" xmlns:p="http://schemas.openxmlformats.org/presentationml/2006/main">
+  <p:cSld>
+    <p:spTree>
+      <p:nvGrpSpPr>
+        <p:cNvPr id="1" name=""/>
+        <p:cNvGrpSpPr/>
+        <p:nvPr/>
+      </p:nvGrpSpPr>
+      <p:grpSpPr>
+        <a:xfrm>
+          <a:off x="0" y="0"/>
+          <a:ext cx="0" cy="0"/>
+          <a:chOff x="0" y="0"/>
+          <a:chExt cx="0" cy="0"/>
+        </a:xfrm>
+      </p:grpSpPr>
+      <p:sp>
+        <p:nvSpPr>
+          <p:cNvPr id="2" name="Rectangle 1">
+            <a:extLst>
+              <a:ext uri="{FF2B5EF4-FFF2-40B4-BE49-F238E27FC236}">
+                <a16:creationId xmlns:a16="http://schemas.microsoft.com/office/drawing/2014/main" id="{00150379-5BCE-4EC0-83E8-3BA89961B58E}"/>
+              </a:ext>
+            </a:extLst>
+          </p:cNvPr>
+          <p:cNvSpPr/>
+          <p:nvPr/>
+        </p:nvSpPr>
+        <p:spPr>
+          <a:xfrm>
+            <a:off x="0" y="279699"/>
+            <a:ext cx="12192000" cy="6228677"/>
+          </a:xfrm>
+          <a:prstGeom prst="rect">
+            <a:avLst/>
+          </a:prstGeom>
+        </p:spPr>
+        <p:style>
+          <a:lnRef idx="2">
+            <a:schemeClr val="accent1">
+              <a:shade val="50000"/>
+            </a:schemeClr>
+          </a:lnRef>
+          <a:fillRef idx="1">
+            <a:schemeClr val="accent1"/>
+          </a:fillRef>
+          <a:effectRef idx="0">
+            <a:schemeClr val="accent1"/>
+          </a:effectRef>
+          <a:fontRef idx="minor">
+            <a:schemeClr val="lt1"/>
+          </a:fontRef>
+        </p:style>
+        <p:txBody>
+          <a:bodyPr rtlCol="0" anchor="ctr"/>
+          <a:lstStyle/>
+          <a:p>
+            <a:pPr algn="ctr"/>
+            <a:endParaRPr lang="en-IE"/>
+          </a:p>
+        </p:txBody>
+      </p:sp>
+      <p:sp>
+        <p:nvSpPr>
+          <p:cNvPr id="4" name="Ellipse 3">
+            <a:extLst>
+              <a:ext uri="{FF2B5EF4-FFF2-40B4-BE49-F238E27FC236}">
+                <a16:creationId xmlns:a16="http://schemas.microsoft.com/office/drawing/2014/main" id="{DB7ACC13-B9CC-43DE-A9DD-1DA581F25668}"/>
+              </a:ext>
+            </a:extLst>
+          </p:cNvPr>
+          <p:cNvSpPr/>
+          <p:nvPr/>
+        </p:nvSpPr>
+        <p:spPr>
+          <a:xfrm>
+            <a:off x="2791805" y="2755570"/>
+            <a:ext cx="406353" cy="406353"/>
+          </a:xfrm>
+          <a:prstGeom prst="ellipse">
+            <a:avLst/>
+          </a:prstGeom>
+          <a:solidFill>
+            <a:srgbClr val="94BE8E"/>
+          </a:solidFill>
+          <a:ln w="19050">
+            <a:solidFill>
+              <a:schemeClr val="bg1"/>
+            </a:solidFill>
+          </a:ln>
+        </p:spPr>
+        <p:style>
+          <a:lnRef idx="2">
+            <a:schemeClr val="accent1">
+              <a:shade val="50000"/>
+            </a:schemeClr>
+          </a:lnRef>
+          <a:fillRef idx="1">
+            <a:schemeClr val="accent1"/>
+          </a:fillRef>
+          <a:effectRef idx="0">
+            <a:schemeClr val="accent1"/>
+          </a:effectRef>
+          <a:fontRef idx="minor">
+            <a:schemeClr val="lt1"/>
+          </a:fontRef>
+        </p:style>
+        <p:txBody>
+          <a:bodyPr rtlCol="0" anchor="ctr"/>
+          <a:lstStyle/>
+          <a:p>
+            <a:pPr algn="ctr"/>
+            <a:endParaRPr lang="en-IE" dirty="0">
+              <a:solidFill>
+                <a:schemeClr val="tx1"/>
+              </a:solidFill>
+            </a:endParaRPr>
+          </a:p>
+        </p:txBody>
+      </p:sp>
+      <p:sp>
+        <p:nvSpPr>
+          <p:cNvPr id="7" name="ZoneTexte 6">
+            <a:extLst>
+              <a:ext uri="{FF2B5EF4-FFF2-40B4-BE49-F238E27FC236}">
+                <a16:creationId xmlns:a16="http://schemas.microsoft.com/office/drawing/2014/main" id="{158DAE26-BB52-4E5F-A0F1-A4AC155B614A}"/>
+              </a:ext>
+            </a:extLst>
+          </p:cNvPr>
+          <p:cNvSpPr txBox="1"/>
+          <p:nvPr/>
+        </p:nvSpPr>
+        <p:spPr>
+          <a:xfrm>
+            <a:off x="1645312" y="1955417"/>
+            <a:ext cx="684803" cy="369332"/>
+          </a:xfrm>
+          <a:prstGeom prst="rect">
+            <a:avLst/>
+          </a:prstGeom>
+          <a:noFill/>
+        </p:spPr>
+        <p:txBody>
+          <a:bodyPr wrap="none" rtlCol="0">
+            <a:spAutoFit/>
+          </a:bodyPr>
+          <a:lstStyle/>
+          <a:p>
+            <a:pPr algn="ctr"/>
+            <a:r>
+              <a:rPr lang="en-IE" dirty="0">
+                <a:solidFill>
+                  <a:schemeClr val="bg1"/>
+                </a:solidFill>
+              </a:rPr>
+              <a:t>Input</a:t>
+            </a:r>
+          </a:p>
+        </p:txBody>
+      </p:sp>
+      <p:sp>
+        <p:nvSpPr>
+          <p:cNvPr id="8" name="ZoneTexte 7">
+            <a:extLst>
+              <a:ext uri="{FF2B5EF4-FFF2-40B4-BE49-F238E27FC236}">
+                <a16:creationId xmlns:a16="http://schemas.microsoft.com/office/drawing/2014/main" id="{8A5696EE-1763-4D66-B2B5-999F7084823A}"/>
+              </a:ext>
+            </a:extLst>
+          </p:cNvPr>
+          <p:cNvSpPr txBox="1"/>
+          <p:nvPr/>
+        </p:nvSpPr>
+        <p:spPr>
+          <a:xfrm>
+            <a:off x="6830974" y="1963389"/>
+            <a:ext cx="1012906" cy="369332"/>
+          </a:xfrm>
+          <a:prstGeom prst="rect">
+            <a:avLst/>
+          </a:prstGeom>
+          <a:noFill/>
+        </p:spPr>
+        <p:txBody>
+          <a:bodyPr wrap="none" rtlCol="0">
+            <a:spAutoFit/>
+          </a:bodyPr>
+          <a:lstStyle/>
+          <a:p>
+            <a:pPr algn="ctr"/>
+            <a:r>
+              <a:rPr lang="en-IE" dirty="0" err="1">
+                <a:solidFill>
+                  <a:schemeClr val="bg1"/>
+                </a:solidFill>
+              </a:rPr>
+              <a:t>FluxPrint</a:t>
+            </a:r>
+            <a:endParaRPr lang="en-IE" dirty="0">
+              <a:solidFill>
+                <a:schemeClr val="bg1"/>
+              </a:solidFill>
+            </a:endParaRPr>
+          </a:p>
+        </p:txBody>
+      </p:sp>
+      <p:sp>
+        <p:nvSpPr>
+          <p:cNvPr id="9" name="Rectangle 8">
+            <a:extLst>
+              <a:ext uri="{FF2B5EF4-FFF2-40B4-BE49-F238E27FC236}">
+                <a16:creationId xmlns:a16="http://schemas.microsoft.com/office/drawing/2014/main" id="{AC0ED27F-2AF0-4668-97EE-9C31B7C0E754}"/>
+              </a:ext>
+            </a:extLst>
+          </p:cNvPr>
+          <p:cNvSpPr/>
+          <p:nvPr/>
+        </p:nvSpPr>
+        <p:spPr>
+          <a:xfrm>
+            <a:off x="4802390" y="2391593"/>
+            <a:ext cx="1022460" cy="369332"/>
+          </a:xfrm>
+          <a:prstGeom prst="rect">
+            <a:avLst/>
+          </a:prstGeom>
+        </p:spPr>
+        <p:txBody>
+          <a:bodyPr wrap="none">
+            <a:spAutoFit/>
+          </a:bodyPr>
+          <a:lstStyle/>
+          <a:p>
+            <a:pPr algn="ctr"/>
+            <a:r>
+              <a:rPr lang="en-IE" dirty="0">
+                <a:solidFill>
+                  <a:schemeClr val="bg1"/>
+                </a:solidFill>
+              </a:rPr>
+              <a:t>footprint</a:t>
+            </a:r>
+          </a:p>
+        </p:txBody>
+      </p:sp>
+      <p:sp>
+        <p:nvSpPr>
+          <p:cNvPr id="10" name="Ellipse 9">
+            <a:extLst>
+              <a:ext uri="{FF2B5EF4-FFF2-40B4-BE49-F238E27FC236}">
+                <a16:creationId xmlns:a16="http://schemas.microsoft.com/office/drawing/2014/main" id="{17223BC8-0DEC-4B58-AFD2-90F54B86CD43}"/>
+              </a:ext>
+            </a:extLst>
+          </p:cNvPr>
+          <p:cNvSpPr/>
+          <p:nvPr/>
+        </p:nvSpPr>
+        <p:spPr>
+          <a:xfrm>
+            <a:off x="2803199" y="3273715"/>
+            <a:ext cx="406353" cy="406353"/>
+          </a:xfrm>
+          <a:prstGeom prst="ellipse">
+            <a:avLst/>
+          </a:prstGeom>
+          <a:solidFill>
+            <a:srgbClr val="94BE8E"/>
+          </a:solidFill>
+          <a:ln w="19050">
+            <a:solidFill>
+              <a:schemeClr val="bg1"/>
+            </a:solidFill>
+          </a:ln>
+        </p:spPr>
+        <p:style>
+          <a:lnRef idx="2">
+            <a:schemeClr val="accent1">
+              <a:shade val="50000"/>
+            </a:schemeClr>
+          </a:lnRef>
+          <a:fillRef idx="1">
+            <a:schemeClr val="accent1"/>
+          </a:fillRef>
+          <a:effectRef idx="0">
+            <a:schemeClr val="accent1"/>
+          </a:effectRef>
+          <a:fontRef idx="minor">
+            <a:schemeClr val="lt1"/>
+          </a:fontRef>
+        </p:style>
+        <p:txBody>
+          <a:bodyPr rtlCol="0" anchor="ctr"/>
+          <a:lstStyle/>
+          <a:p>
+            <a:pPr algn="ctr"/>
+            <a:endParaRPr lang="en-IE" dirty="0">
+              <a:solidFill>
+                <a:schemeClr val="tx1"/>
+              </a:solidFill>
+            </a:endParaRPr>
+          </a:p>
+        </p:txBody>
+      </p:sp>
+      <p:sp>
+        <p:nvSpPr>
+          <p:cNvPr id="11" name="ZoneTexte 10">
+            <a:extLst>
+              <a:ext uri="{FF2B5EF4-FFF2-40B4-BE49-F238E27FC236}">
+                <a16:creationId xmlns:a16="http://schemas.microsoft.com/office/drawing/2014/main" id="{3F5D744A-B82E-4367-9CB0-8EFAD37619F8}"/>
+              </a:ext>
+            </a:extLst>
+          </p:cNvPr>
+          <p:cNvSpPr txBox="1"/>
+          <p:nvPr/>
+        </p:nvSpPr>
+        <p:spPr>
+          <a:xfrm>
+            <a:off x="669213" y="2659636"/>
+            <a:ext cx="2047740" cy="584775"/>
+          </a:xfrm>
+          <a:prstGeom prst="rect">
+            <a:avLst/>
+          </a:prstGeom>
+          <a:noFill/>
+        </p:spPr>
+        <p:txBody>
+          <a:bodyPr wrap="none" rtlCol="0">
+            <a:spAutoFit/>
+          </a:bodyPr>
+          <a:lstStyle/>
+          <a:p>
+            <a:pPr algn="r"/>
+            <a:r>
+              <a:rPr lang="en-IE" sz="1600" dirty="0">
+                <a:solidFill>
+                  <a:schemeClr val="bg1"/>
+                </a:solidFill>
+              </a:rPr>
+              <a:t>Data</a:t>
+            </a:r>
+            <a:br>
+              <a:rPr lang="en-IE" sz="1600" dirty="0">
+                <a:solidFill>
+                  <a:schemeClr val="bg1"/>
+                </a:solidFill>
+              </a:rPr>
+            </a:br>
+            <a:r>
+              <a:rPr lang="en-IE" sz="1600" i="1" dirty="0" err="1">
+                <a:solidFill>
+                  <a:schemeClr val="bg1"/>
+                </a:solidFill>
+              </a:rPr>
+              <a:t>DataFrame</a:t>
+            </a:r>
+            <a:r>
+              <a:rPr lang="en-IE" sz="1600" i="1" dirty="0">
+                <a:solidFill>
+                  <a:schemeClr val="bg1"/>
+                </a:solidFill>
+              </a:rPr>
+              <a:t>, dictionary</a:t>
+            </a:r>
+            <a:endParaRPr lang="en-IE" sz="1600" dirty="0">
+              <a:solidFill>
+                <a:schemeClr val="bg1"/>
+              </a:solidFill>
+            </a:endParaRPr>
+          </a:p>
+        </p:txBody>
+      </p:sp>
+      <p:sp>
+        <p:nvSpPr>
+          <p:cNvPr id="13" name="Rectangle 12">
+            <a:extLst>
+              <a:ext uri="{FF2B5EF4-FFF2-40B4-BE49-F238E27FC236}">
+                <a16:creationId xmlns:a16="http://schemas.microsoft.com/office/drawing/2014/main" id="{525E0273-13CD-454A-AE9F-9BFE81E51984}"/>
+              </a:ext>
+            </a:extLst>
+          </p:cNvPr>
+          <p:cNvSpPr/>
+          <p:nvPr/>
+        </p:nvSpPr>
+        <p:spPr>
+          <a:xfrm>
+            <a:off x="3737519" y="2391593"/>
+            <a:ext cx="975012" cy="369332"/>
+          </a:xfrm>
+          <a:prstGeom prst="rect">
+            <a:avLst/>
+          </a:prstGeom>
+        </p:spPr>
+        <p:txBody>
+          <a:bodyPr wrap="none">
+            <a:spAutoFit/>
+          </a:bodyPr>
+          <a:lstStyle/>
+          <a:p>
+            <a:pPr algn="ctr"/>
+            <a:r>
+              <a:rPr lang="en-IE" dirty="0">
+                <a:solidFill>
+                  <a:schemeClr val="bg1"/>
+                </a:solidFill>
+              </a:rPr>
+              <a:t>wrapper</a:t>
+            </a:r>
+          </a:p>
+        </p:txBody>
+      </p:sp>
+      <p:cxnSp>
+        <p:nvCxnSpPr>
+          <p:cNvPr id="14" name="Connecteur droit avec flèche 13">
+            <a:extLst>
+              <a:ext uri="{FF2B5EF4-FFF2-40B4-BE49-F238E27FC236}">
+                <a16:creationId xmlns:a16="http://schemas.microsoft.com/office/drawing/2014/main" id="{9676F2BF-8CA9-40C3-8FEE-462EAFB960AE}"/>
+              </a:ext>
+            </a:extLst>
+          </p:cNvPr>
+          <p:cNvCxnSpPr>
+            <a:cxnSpLocks/>
+            <a:stCxn id="10" idx="6"/>
+            <a:endCxn id="18" idx="2"/>
+          </p:cNvCxnSpPr>
+          <p:nvPr/>
+        </p:nvCxnSpPr>
+        <p:spPr>
+          <a:xfrm flipV="1">
+            <a:off x="3209552" y="3155201"/>
+            <a:ext cx="812297" cy="321691"/>
+          </a:xfrm>
+          <a:prstGeom prst="straightConnector1">
+            <a:avLst/>
+          </a:prstGeom>
+          <a:ln>
+            <a:solidFill>
+              <a:schemeClr val="bg1"/>
+            </a:solidFill>
+            <a:tailEnd type="triangle"/>
+          </a:ln>
+        </p:spPr>
+        <p:style>
+          <a:lnRef idx="1">
+            <a:schemeClr val="dk1"/>
+          </a:lnRef>
+          <a:fillRef idx="0">
+            <a:schemeClr val="dk1"/>
+          </a:fillRef>
+          <a:effectRef idx="0">
+            <a:schemeClr val="dk1"/>
+          </a:effectRef>
+          <a:fontRef idx="minor">
+            <a:schemeClr val="tx1"/>
+          </a:fontRef>
+        </p:style>
+      </p:cxnSp>
+      <p:cxnSp>
+        <p:nvCxnSpPr>
+          <p:cNvPr id="15" name="Connecteur droit avec flèche 14">
+            <a:extLst>
+              <a:ext uri="{FF2B5EF4-FFF2-40B4-BE49-F238E27FC236}">
+                <a16:creationId xmlns:a16="http://schemas.microsoft.com/office/drawing/2014/main" id="{19E0BC29-582C-4644-B2BD-D18517FDFE5C}"/>
+              </a:ext>
+            </a:extLst>
+          </p:cNvPr>
+          <p:cNvCxnSpPr>
+            <a:cxnSpLocks/>
+            <a:stCxn id="4" idx="6"/>
+            <a:endCxn id="18" idx="2"/>
+          </p:cNvCxnSpPr>
+          <p:nvPr/>
+        </p:nvCxnSpPr>
+        <p:spPr>
+          <a:xfrm>
+            <a:off x="3198158" y="2958747"/>
+            <a:ext cx="823691" cy="196454"/>
+          </a:xfrm>
+          <a:prstGeom prst="straightConnector1">
+            <a:avLst/>
+          </a:prstGeom>
+          <a:ln>
+            <a:solidFill>
+              <a:schemeClr val="bg1"/>
+            </a:solidFill>
+            <a:tailEnd type="triangle"/>
+          </a:ln>
+        </p:spPr>
+        <p:style>
+          <a:lnRef idx="1">
+            <a:schemeClr val="dk1"/>
+          </a:lnRef>
+          <a:fillRef idx="0">
+            <a:schemeClr val="dk1"/>
+          </a:fillRef>
+          <a:effectRef idx="0">
+            <a:schemeClr val="dk1"/>
+          </a:effectRef>
+          <a:fontRef idx="minor">
+            <a:schemeClr val="tx1"/>
+          </a:fontRef>
+        </p:style>
+      </p:cxnSp>
+      <p:sp>
+        <p:nvSpPr>
+          <p:cNvPr id="18" name="Ellipse 17">
+            <a:extLst>
+              <a:ext uri="{FF2B5EF4-FFF2-40B4-BE49-F238E27FC236}">
+                <a16:creationId xmlns:a16="http://schemas.microsoft.com/office/drawing/2014/main" id="{7177BA2F-AD83-470B-9D06-D2702B918518}"/>
+              </a:ext>
+            </a:extLst>
+          </p:cNvPr>
+          <p:cNvSpPr/>
+          <p:nvPr/>
+        </p:nvSpPr>
+        <p:spPr>
+          <a:xfrm>
+            <a:off x="4021849" y="2952024"/>
+            <a:ext cx="406353" cy="406353"/>
+          </a:xfrm>
+          <a:prstGeom prst="ellipse">
+            <a:avLst/>
+          </a:prstGeom>
+          <a:noFill/>
+          <a:ln w="19050">
+            <a:solidFill>
+              <a:schemeClr val="bg1"/>
+            </a:solidFill>
+          </a:ln>
+        </p:spPr>
+        <p:style>
+          <a:lnRef idx="2">
+            <a:schemeClr val="accent1">
+              <a:shade val="50000"/>
+            </a:schemeClr>
+          </a:lnRef>
+          <a:fillRef idx="1">
+            <a:schemeClr val="accent1"/>
+          </a:fillRef>
+          <a:effectRef idx="0">
+            <a:schemeClr val="accent1"/>
+          </a:effectRef>
+          <a:fontRef idx="minor">
+            <a:schemeClr val="lt1"/>
+          </a:fontRef>
+        </p:style>
+        <p:txBody>
+          <a:bodyPr rtlCol="0" anchor="ctr"/>
+          <a:lstStyle/>
+          <a:p>
+            <a:pPr algn="ctr"/>
+            <a:r>
+              <a:rPr lang="en-IE" i="1" dirty="0">
+                <a:solidFill>
+                  <a:schemeClr val="bg1"/>
+                </a:solidFill>
+                <a:sym typeface="Symbol" panose="05050102010706020507" pitchFamily="18" charset="2"/>
+              </a:rPr>
+              <a:t>f</a:t>
+            </a:r>
+            <a:endParaRPr lang="en-IE" i="1" dirty="0">
+              <a:solidFill>
+                <a:schemeClr val="bg1"/>
+              </a:solidFill>
+            </a:endParaRPr>
+          </a:p>
+        </p:txBody>
+      </p:sp>
+      <p:sp>
+        <p:nvSpPr>
+          <p:cNvPr id="19" name="Accolade fermante 18">
+            <a:extLst>
+              <a:ext uri="{FF2B5EF4-FFF2-40B4-BE49-F238E27FC236}">
+                <a16:creationId xmlns:a16="http://schemas.microsoft.com/office/drawing/2014/main" id="{A24516A9-364B-4094-B1A3-05EAF0D5B9A6}"/>
+              </a:ext>
+            </a:extLst>
+          </p:cNvPr>
+          <p:cNvSpPr/>
+          <p:nvPr/>
+        </p:nvSpPr>
+        <p:spPr>
+          <a:xfrm rot="16200000">
+            <a:off x="1935015" y="1124087"/>
+            <a:ext cx="105398" cy="2527627"/>
+          </a:xfrm>
+          <a:prstGeom prst="rightBrace">
+            <a:avLst/>
+          </a:prstGeom>
+          <a:ln w="12700">
+            <a:solidFill>
+              <a:schemeClr val="bg1"/>
+            </a:solidFill>
+          </a:ln>
+        </p:spPr>
+        <p:style>
+          <a:lnRef idx="1">
+            <a:schemeClr val="dk1"/>
+          </a:lnRef>
+          <a:fillRef idx="0">
+            <a:schemeClr val="dk1"/>
+          </a:fillRef>
+          <a:effectRef idx="0">
+            <a:schemeClr val="dk1"/>
+          </a:effectRef>
+          <a:fontRef idx="minor">
+            <a:schemeClr val="tx1"/>
+          </a:fontRef>
+        </p:style>
+        <p:txBody>
+          <a:bodyPr rtlCol="0" anchor="ctr"/>
+          <a:lstStyle/>
+          <a:p>
+            <a:pPr algn="ctr"/>
+            <a:endParaRPr lang="en-IE"/>
+          </a:p>
+        </p:txBody>
+      </p:sp>
+      <p:sp>
+        <p:nvSpPr>
+          <p:cNvPr id="20" name="Accolade fermante 19">
+            <a:extLst>
+              <a:ext uri="{FF2B5EF4-FFF2-40B4-BE49-F238E27FC236}">
+                <a16:creationId xmlns:a16="http://schemas.microsoft.com/office/drawing/2014/main" id="{B8E60703-AF87-47C4-841C-7D711538990C}"/>
+              </a:ext>
+            </a:extLst>
+          </p:cNvPr>
+          <p:cNvSpPr/>
+          <p:nvPr/>
+        </p:nvSpPr>
+        <p:spPr>
+          <a:xfrm rot="16200000">
+            <a:off x="7284728" y="-1177379"/>
+            <a:ext cx="105398" cy="7124695"/>
+          </a:xfrm>
+          <a:prstGeom prst="rightBrace">
+            <a:avLst/>
+          </a:prstGeom>
+          <a:ln w="12700">
+            <a:solidFill>
+              <a:schemeClr val="bg1"/>
+            </a:solidFill>
+          </a:ln>
+        </p:spPr>
+        <p:style>
+          <a:lnRef idx="1">
+            <a:schemeClr val="dk1"/>
+          </a:lnRef>
+          <a:fillRef idx="0">
+            <a:schemeClr val="dk1"/>
+          </a:fillRef>
+          <a:effectRef idx="0">
+            <a:schemeClr val="dk1"/>
+          </a:effectRef>
+          <a:fontRef idx="minor">
+            <a:schemeClr val="tx1"/>
+          </a:fontRef>
+        </p:style>
+        <p:txBody>
+          <a:bodyPr rtlCol="0" anchor="ctr"/>
+          <a:lstStyle/>
+          <a:p>
+            <a:pPr algn="ctr"/>
+            <a:endParaRPr lang="en-IE"/>
+          </a:p>
+        </p:txBody>
+      </p:sp>
+      <p:sp>
+        <p:nvSpPr>
+          <p:cNvPr id="26" name="ZoneTexte 25">
+            <a:extLst>
+              <a:ext uri="{FF2B5EF4-FFF2-40B4-BE49-F238E27FC236}">
+                <a16:creationId xmlns:a16="http://schemas.microsoft.com/office/drawing/2014/main" id="{F03581F9-0E86-417B-93FD-BB07A8AEE168}"/>
+              </a:ext>
+            </a:extLst>
+          </p:cNvPr>
+          <p:cNvSpPr txBox="1"/>
+          <p:nvPr/>
+        </p:nvSpPr>
+        <p:spPr>
+          <a:xfrm>
+            <a:off x="1201424" y="3184503"/>
+            <a:ext cx="1547218" cy="584775"/>
+          </a:xfrm>
+          <a:prstGeom prst="rect">
+            <a:avLst/>
+          </a:prstGeom>
+          <a:noFill/>
+        </p:spPr>
+        <p:txBody>
+          <a:bodyPr wrap="none" rtlCol="0">
+            <a:spAutoFit/>
+          </a:bodyPr>
+          <a:lstStyle/>
+          <a:p>
+            <a:pPr algn="r"/>
+            <a:r>
+              <a:rPr lang="en-IE" sz="1600" dirty="0">
+                <a:solidFill>
+                  <a:schemeClr val="bg1"/>
+                </a:solidFill>
+              </a:rPr>
+              <a:t>URL</a:t>
+            </a:r>
+            <a:br>
+              <a:rPr lang="en-IE" sz="1600" dirty="0">
+                <a:solidFill>
+                  <a:schemeClr val="bg1"/>
+                </a:solidFill>
+              </a:rPr>
+            </a:br>
+            <a:r>
+              <a:rPr lang="en-IE" sz="1600" dirty="0">
+                <a:solidFill>
+                  <a:schemeClr val="bg1"/>
+                </a:solidFill>
+              </a:rPr>
+              <a:t>ICOS Data Portal</a:t>
+            </a:r>
+          </a:p>
+        </p:txBody>
+      </p:sp>
+      <p:sp>
+        <p:nvSpPr>
+          <p:cNvPr id="36" name="Ellipse 35">
+            <a:extLst>
+              <a:ext uri="{FF2B5EF4-FFF2-40B4-BE49-F238E27FC236}">
+                <a16:creationId xmlns:a16="http://schemas.microsoft.com/office/drawing/2014/main" id="{D9BE9B37-0F5D-4B21-AB0A-1F3E1177AF20}"/>
+              </a:ext>
+            </a:extLst>
+          </p:cNvPr>
+          <p:cNvSpPr/>
+          <p:nvPr/>
+        </p:nvSpPr>
+        <p:spPr>
+          <a:xfrm>
+            <a:off x="5110444" y="2951653"/>
+            <a:ext cx="406353" cy="406353"/>
+          </a:xfrm>
+          <a:prstGeom prst="ellipse">
+            <a:avLst/>
+          </a:prstGeom>
+          <a:noFill/>
+          <a:ln w="19050">
+            <a:solidFill>
+              <a:schemeClr val="bg1"/>
+            </a:solidFill>
+          </a:ln>
+        </p:spPr>
+        <p:style>
+          <a:lnRef idx="2">
+            <a:schemeClr val="accent1">
+              <a:shade val="50000"/>
+            </a:schemeClr>
+          </a:lnRef>
+          <a:fillRef idx="1">
+            <a:schemeClr val="accent1"/>
+          </a:fillRef>
+          <a:effectRef idx="0">
+            <a:schemeClr val="accent1"/>
+          </a:effectRef>
+          <a:fontRef idx="minor">
+            <a:schemeClr val="lt1"/>
+          </a:fontRef>
+        </p:style>
+        <p:txBody>
+          <a:bodyPr rtlCol="0" anchor="ctr"/>
+          <a:lstStyle/>
+          <a:p>
+            <a:pPr algn="ctr"/>
+            <a:r>
+              <a:rPr lang="en-IE" dirty="0">
+                <a:solidFill>
+                  <a:schemeClr val="bg1"/>
+                </a:solidFill>
+                <a:sym typeface="Symbol" panose="05050102010706020507" pitchFamily="18" charset="2"/>
+              </a:rPr>
+              <a:t></a:t>
+            </a:r>
+            <a:endParaRPr lang="en-IE" dirty="0">
+              <a:solidFill>
+                <a:schemeClr val="bg1"/>
+              </a:solidFill>
+            </a:endParaRPr>
+          </a:p>
+        </p:txBody>
+      </p:sp>
+      <p:cxnSp>
+        <p:nvCxnSpPr>
+          <p:cNvPr id="37" name="Connecteur droit avec flèche 36">
+            <a:extLst>
+              <a:ext uri="{FF2B5EF4-FFF2-40B4-BE49-F238E27FC236}">
+                <a16:creationId xmlns:a16="http://schemas.microsoft.com/office/drawing/2014/main" id="{4982FAF9-1547-4FEA-9057-320D2A64E599}"/>
+              </a:ext>
+            </a:extLst>
+          </p:cNvPr>
+          <p:cNvCxnSpPr>
+            <a:cxnSpLocks/>
+            <a:stCxn id="18" idx="6"/>
+            <a:endCxn id="36" idx="2"/>
+          </p:cNvCxnSpPr>
+          <p:nvPr/>
+        </p:nvCxnSpPr>
+        <p:spPr>
+          <a:xfrm flipV="1">
+            <a:off x="4428202" y="3154830"/>
+            <a:ext cx="682242" cy="371"/>
+          </a:xfrm>
+          <a:prstGeom prst="straightConnector1">
+            <a:avLst/>
+          </a:prstGeom>
+          <a:ln>
+            <a:solidFill>
+              <a:schemeClr val="bg1"/>
+            </a:solidFill>
+            <a:tailEnd type="triangle"/>
+          </a:ln>
+        </p:spPr>
+        <p:style>
+          <a:lnRef idx="1">
+            <a:schemeClr val="dk1"/>
+          </a:lnRef>
+          <a:fillRef idx="0">
+            <a:schemeClr val="dk1"/>
+          </a:fillRef>
+          <a:effectRef idx="0">
+            <a:schemeClr val="dk1"/>
+          </a:effectRef>
+          <a:fontRef idx="minor">
+            <a:schemeClr val="tx1"/>
+          </a:fontRef>
+        </p:style>
+      </p:cxnSp>
+      <p:cxnSp>
+        <p:nvCxnSpPr>
+          <p:cNvPr id="42" name="Connecteur droit avec flèche 41">
+            <a:extLst>
+              <a:ext uri="{FF2B5EF4-FFF2-40B4-BE49-F238E27FC236}">
+                <a16:creationId xmlns:a16="http://schemas.microsoft.com/office/drawing/2014/main" id="{D99FA26B-1A90-4CE2-9B63-C3A053ACD500}"/>
+              </a:ext>
+            </a:extLst>
+          </p:cNvPr>
+          <p:cNvCxnSpPr>
+            <a:cxnSpLocks/>
+            <a:stCxn id="36" idx="6"/>
+            <a:endCxn id="43" idx="2"/>
+          </p:cNvCxnSpPr>
+          <p:nvPr/>
+        </p:nvCxnSpPr>
+        <p:spPr>
+          <a:xfrm flipV="1">
+            <a:off x="5516797" y="3154458"/>
+            <a:ext cx="784773" cy="372"/>
+          </a:xfrm>
+          <a:prstGeom prst="straightConnector1">
+            <a:avLst/>
+          </a:prstGeom>
+          <a:ln>
+            <a:solidFill>
+              <a:schemeClr val="bg1"/>
+            </a:solidFill>
+            <a:tailEnd type="triangle"/>
+          </a:ln>
+        </p:spPr>
+        <p:style>
+          <a:lnRef idx="1">
+            <a:schemeClr val="dk1"/>
+          </a:lnRef>
+          <a:fillRef idx="0">
+            <a:schemeClr val="dk1"/>
+          </a:fillRef>
+          <a:effectRef idx="0">
+            <a:schemeClr val="dk1"/>
+          </a:effectRef>
+          <a:fontRef idx="minor">
+            <a:schemeClr val="tx1"/>
+          </a:fontRef>
+        </p:style>
+      </p:cxnSp>
+      <p:sp>
+        <p:nvSpPr>
+          <p:cNvPr id="43" name="Ellipse 42">
+            <a:extLst>
+              <a:ext uri="{FF2B5EF4-FFF2-40B4-BE49-F238E27FC236}">
+                <a16:creationId xmlns:a16="http://schemas.microsoft.com/office/drawing/2014/main" id="{80AB28D9-AD3C-4358-90F4-AB168D86BA85}"/>
+              </a:ext>
+            </a:extLst>
+          </p:cNvPr>
+          <p:cNvSpPr/>
+          <p:nvPr/>
+        </p:nvSpPr>
+        <p:spPr>
+          <a:xfrm>
+            <a:off x="6301570" y="2951281"/>
+            <a:ext cx="406353" cy="406353"/>
+          </a:xfrm>
+          <a:prstGeom prst="ellipse">
+            <a:avLst/>
+          </a:prstGeom>
+          <a:noFill/>
+          <a:ln w="19050">
+            <a:solidFill>
+              <a:schemeClr val="bg1"/>
+            </a:solidFill>
+          </a:ln>
+        </p:spPr>
+        <p:style>
+          <a:lnRef idx="2">
+            <a:schemeClr val="accent1">
+              <a:shade val="50000"/>
+            </a:schemeClr>
+          </a:lnRef>
+          <a:fillRef idx="1">
+            <a:schemeClr val="accent1"/>
+          </a:fillRef>
+          <a:effectRef idx="0">
+            <a:schemeClr val="accent1"/>
+          </a:effectRef>
+          <a:fontRef idx="minor">
+            <a:schemeClr val="lt1"/>
+          </a:fontRef>
+        </p:style>
+        <p:txBody>
+          <a:bodyPr rtlCol="0" anchor="ctr"/>
+          <a:lstStyle/>
+          <a:p>
+            <a:pPr algn="ctr"/>
+            <a:endParaRPr lang="en-IE" sz="900" dirty="0">
+              <a:solidFill>
+                <a:schemeClr val="tx1"/>
+              </a:solidFill>
+            </a:endParaRPr>
+          </a:p>
+        </p:txBody>
+      </p:sp>
+      <p:sp>
+        <p:nvSpPr>
+          <p:cNvPr id="49" name="Rectangle 48">
+            <a:extLst>
+              <a:ext uri="{FF2B5EF4-FFF2-40B4-BE49-F238E27FC236}">
+                <a16:creationId xmlns:a16="http://schemas.microsoft.com/office/drawing/2014/main" id="{E2568FAC-DCC1-49B9-931D-A82D5FCC23D7}"/>
+              </a:ext>
+            </a:extLst>
+          </p:cNvPr>
+          <p:cNvSpPr/>
+          <p:nvPr/>
+        </p:nvSpPr>
+        <p:spPr>
+          <a:xfrm>
+            <a:off x="5791123" y="2391593"/>
+            <a:ext cx="1427250" cy="369332"/>
+          </a:xfrm>
+          <a:prstGeom prst="rect">
+            <a:avLst/>
+          </a:prstGeom>
+        </p:spPr>
+        <p:txBody>
+          <a:bodyPr wrap="none">
+            <a:spAutoFit/>
+          </a:bodyPr>
+          <a:lstStyle/>
+          <a:p>
+            <a:pPr algn="ctr"/>
+            <a:r>
+              <a:rPr lang="en-IE" dirty="0" err="1">
+                <a:solidFill>
+                  <a:schemeClr val="bg1"/>
+                </a:solidFill>
+              </a:rPr>
+              <a:t>georeference</a:t>
+            </a:r>
+            <a:endParaRPr lang="en-IE" dirty="0">
+              <a:solidFill>
+                <a:schemeClr val="bg1"/>
+              </a:solidFill>
+            </a:endParaRPr>
+          </a:p>
+        </p:txBody>
+      </p:sp>
+      <p:sp>
+        <p:nvSpPr>
+          <p:cNvPr id="50" name="Rectangle 49">
+            <a:extLst>
+              <a:ext uri="{FF2B5EF4-FFF2-40B4-BE49-F238E27FC236}">
+                <a16:creationId xmlns:a16="http://schemas.microsoft.com/office/drawing/2014/main" id="{E1773B6E-80DD-4CD4-9572-9E858F55B842}"/>
+              </a:ext>
+            </a:extLst>
+          </p:cNvPr>
+          <p:cNvSpPr/>
+          <p:nvPr/>
+        </p:nvSpPr>
+        <p:spPr>
+          <a:xfrm>
+            <a:off x="6268944" y="2985180"/>
+            <a:ext cx="471603" cy="338554"/>
+          </a:xfrm>
+          <a:prstGeom prst="rect">
+            <a:avLst/>
+          </a:prstGeom>
+        </p:spPr>
+        <p:txBody>
+          <a:bodyPr wrap="none" anchor="ctr">
+            <a:spAutoFit/>
+          </a:bodyPr>
+          <a:lstStyle/>
+          <a:p>
+            <a:pPr algn="ctr"/>
+            <a:r>
+              <a:rPr lang="en-IE" sz="1600" dirty="0">
+                <a:solidFill>
+                  <a:schemeClr val="bg1"/>
+                </a:solidFill>
+                <a:sym typeface="Symbol" panose="05050102010706020507" pitchFamily="18" charset="2"/>
+              </a:rPr>
+              <a:t>,</a:t>
+            </a:r>
+            <a:endParaRPr lang="en-IE" sz="1600" dirty="0">
+              <a:solidFill>
+                <a:schemeClr val="bg1"/>
+              </a:solidFill>
+            </a:endParaRPr>
+          </a:p>
+        </p:txBody>
+      </p:sp>
+      <p:cxnSp>
+        <p:nvCxnSpPr>
+          <p:cNvPr id="51" name="Connecteur droit avec flèche 50">
+            <a:extLst>
+              <a:ext uri="{FF2B5EF4-FFF2-40B4-BE49-F238E27FC236}">
+                <a16:creationId xmlns:a16="http://schemas.microsoft.com/office/drawing/2014/main" id="{2FA3B546-0FD4-45F1-8A65-C727AFDDBAF5}"/>
+              </a:ext>
+            </a:extLst>
+          </p:cNvPr>
+          <p:cNvCxnSpPr>
+            <a:cxnSpLocks/>
+            <a:stCxn id="50" idx="3"/>
+            <a:endCxn id="54" idx="2"/>
+          </p:cNvCxnSpPr>
+          <p:nvPr/>
+        </p:nvCxnSpPr>
+        <p:spPr>
+          <a:xfrm flipV="1">
+            <a:off x="6740547" y="2958747"/>
+            <a:ext cx="660428" cy="195710"/>
+          </a:xfrm>
+          <a:prstGeom prst="straightConnector1">
+            <a:avLst/>
+          </a:prstGeom>
+          <a:ln>
+            <a:solidFill>
+              <a:schemeClr val="bg1"/>
+            </a:solidFill>
+            <a:tailEnd type="triangle"/>
+          </a:ln>
+        </p:spPr>
+        <p:style>
+          <a:lnRef idx="1">
+            <a:schemeClr val="dk1"/>
+          </a:lnRef>
+          <a:fillRef idx="0">
+            <a:schemeClr val="dk1"/>
+          </a:fillRef>
+          <a:effectRef idx="0">
+            <a:schemeClr val="dk1"/>
+          </a:effectRef>
+          <a:fontRef idx="minor">
+            <a:schemeClr val="tx1"/>
+          </a:fontRef>
+        </p:style>
+      </p:cxnSp>
+      <p:sp>
+        <p:nvSpPr>
+          <p:cNvPr id="54" name="Ellipse 53">
+            <a:extLst>
+              <a:ext uri="{FF2B5EF4-FFF2-40B4-BE49-F238E27FC236}">
+                <a16:creationId xmlns:a16="http://schemas.microsoft.com/office/drawing/2014/main" id="{AC9EEACC-4CE4-465E-BF4D-4B7EBFA17C49}"/>
+              </a:ext>
+            </a:extLst>
+          </p:cNvPr>
+          <p:cNvSpPr/>
+          <p:nvPr/>
+        </p:nvSpPr>
+        <p:spPr>
+          <a:xfrm>
+            <a:off x="7400975" y="2755570"/>
+            <a:ext cx="406353" cy="406353"/>
+          </a:xfrm>
+          <a:prstGeom prst="ellipse">
+            <a:avLst/>
+          </a:prstGeom>
+          <a:solidFill>
+            <a:srgbClr val="C18BC2"/>
+          </a:solidFill>
+          <a:ln w="19050">
+            <a:solidFill>
+              <a:schemeClr val="bg1"/>
+            </a:solidFill>
+          </a:ln>
+        </p:spPr>
+        <p:style>
+          <a:lnRef idx="2">
+            <a:schemeClr val="accent1">
+              <a:shade val="50000"/>
+            </a:schemeClr>
+          </a:lnRef>
+          <a:fillRef idx="1">
+            <a:schemeClr val="accent1"/>
+          </a:fillRef>
+          <a:effectRef idx="0">
+            <a:schemeClr val="accent1"/>
+          </a:effectRef>
+          <a:fontRef idx="minor">
+            <a:schemeClr val="lt1"/>
+          </a:fontRef>
+        </p:style>
+        <p:txBody>
+          <a:bodyPr rtlCol="0" anchor="ctr"/>
+          <a:lstStyle/>
+          <a:p>
+            <a:pPr algn="ctr"/>
+            <a:endParaRPr lang="en-IE" dirty="0">
+              <a:solidFill>
+                <a:schemeClr val="tx1"/>
+              </a:solidFill>
+            </a:endParaRPr>
+          </a:p>
+        </p:txBody>
+      </p:sp>
+      <p:sp>
+        <p:nvSpPr>
+          <p:cNvPr id="56" name="Ellipse 55">
+            <a:extLst>
+              <a:ext uri="{FF2B5EF4-FFF2-40B4-BE49-F238E27FC236}">
+                <a16:creationId xmlns:a16="http://schemas.microsoft.com/office/drawing/2014/main" id="{EFD1B277-1BF6-40C1-86AD-A9C3E57413A7}"/>
+              </a:ext>
+            </a:extLst>
+          </p:cNvPr>
+          <p:cNvSpPr/>
+          <p:nvPr/>
+        </p:nvSpPr>
+        <p:spPr>
+          <a:xfrm>
+            <a:off x="7407239" y="3346387"/>
+            <a:ext cx="406353" cy="406353"/>
+          </a:xfrm>
+          <a:prstGeom prst="ellipse">
+            <a:avLst/>
+          </a:prstGeom>
+          <a:solidFill>
+            <a:srgbClr val="C18BC2"/>
+          </a:solidFill>
+          <a:ln w="19050">
+            <a:solidFill>
+              <a:schemeClr val="bg1"/>
+            </a:solidFill>
+          </a:ln>
+        </p:spPr>
+        <p:style>
+          <a:lnRef idx="2">
+            <a:schemeClr val="accent1">
+              <a:shade val="50000"/>
+            </a:schemeClr>
+          </a:lnRef>
+          <a:fillRef idx="1">
+            <a:schemeClr val="accent1"/>
+          </a:fillRef>
+          <a:effectRef idx="0">
+            <a:schemeClr val="accent1"/>
+          </a:effectRef>
+          <a:fontRef idx="minor">
+            <a:schemeClr val="lt1"/>
+          </a:fontRef>
+        </p:style>
+        <p:txBody>
+          <a:bodyPr rtlCol="0" anchor="ctr"/>
+          <a:lstStyle/>
+          <a:p>
+            <a:pPr algn="ctr"/>
+            <a:endParaRPr lang="en-IE" dirty="0">
+              <a:solidFill>
+                <a:schemeClr val="tx1"/>
+              </a:solidFill>
+            </a:endParaRPr>
+          </a:p>
+        </p:txBody>
+      </p:sp>
+      <p:sp>
+        <p:nvSpPr>
+          <p:cNvPr id="57" name="Ellipse 56">
+            <a:extLst>
+              <a:ext uri="{FF2B5EF4-FFF2-40B4-BE49-F238E27FC236}">
+                <a16:creationId xmlns:a16="http://schemas.microsoft.com/office/drawing/2014/main" id="{A3652E1C-D035-430F-BB0D-2E3EB5B1E064}"/>
+              </a:ext>
+            </a:extLst>
+          </p:cNvPr>
+          <p:cNvSpPr/>
+          <p:nvPr/>
+        </p:nvSpPr>
+        <p:spPr>
+          <a:xfrm>
+            <a:off x="7400975" y="3939290"/>
+            <a:ext cx="406353" cy="406353"/>
+          </a:xfrm>
+          <a:prstGeom prst="ellipse">
+            <a:avLst/>
+          </a:prstGeom>
+          <a:solidFill>
+            <a:srgbClr val="C18BC2"/>
+          </a:solidFill>
+          <a:ln w="19050">
+            <a:solidFill>
+              <a:schemeClr val="bg1"/>
+            </a:solidFill>
+          </a:ln>
+        </p:spPr>
+        <p:style>
+          <a:lnRef idx="2">
+            <a:schemeClr val="accent1">
+              <a:shade val="50000"/>
+            </a:schemeClr>
+          </a:lnRef>
+          <a:fillRef idx="1">
+            <a:schemeClr val="accent1"/>
+          </a:fillRef>
+          <a:effectRef idx="0">
+            <a:schemeClr val="accent1"/>
+          </a:effectRef>
+          <a:fontRef idx="minor">
+            <a:schemeClr val="lt1"/>
+          </a:fontRef>
+        </p:style>
+        <p:txBody>
+          <a:bodyPr rtlCol="0" anchor="ctr"/>
+          <a:lstStyle/>
+          <a:p>
+            <a:pPr algn="ctr"/>
+            <a:endParaRPr lang="en-IE" dirty="0">
+              <a:solidFill>
+                <a:schemeClr val="tx1"/>
+              </a:solidFill>
+            </a:endParaRPr>
+          </a:p>
+        </p:txBody>
+      </p:sp>
+      <p:cxnSp>
+        <p:nvCxnSpPr>
+          <p:cNvPr id="59" name="Connecteur droit avec flèche 58">
+            <a:extLst>
+              <a:ext uri="{FF2B5EF4-FFF2-40B4-BE49-F238E27FC236}">
+                <a16:creationId xmlns:a16="http://schemas.microsoft.com/office/drawing/2014/main" id="{43E0880E-7D9E-4120-8DD4-8CFB112B9A6D}"/>
+              </a:ext>
+            </a:extLst>
+          </p:cNvPr>
+          <p:cNvCxnSpPr>
+            <a:cxnSpLocks/>
+            <a:stCxn id="50" idx="3"/>
+            <a:endCxn id="56" idx="2"/>
+          </p:cNvCxnSpPr>
+          <p:nvPr/>
+        </p:nvCxnSpPr>
+        <p:spPr>
+          <a:xfrm>
+            <a:off x="6740547" y="3154457"/>
+            <a:ext cx="666692" cy="395107"/>
+          </a:xfrm>
+          <a:prstGeom prst="straightConnector1">
+            <a:avLst/>
+          </a:prstGeom>
+          <a:ln>
+            <a:solidFill>
+              <a:schemeClr val="bg1"/>
+            </a:solidFill>
+            <a:tailEnd type="triangle"/>
+          </a:ln>
+        </p:spPr>
+        <p:style>
+          <a:lnRef idx="1">
+            <a:schemeClr val="dk1"/>
+          </a:lnRef>
+          <a:fillRef idx="0">
+            <a:schemeClr val="dk1"/>
+          </a:fillRef>
+          <a:effectRef idx="0">
+            <a:schemeClr val="dk1"/>
+          </a:effectRef>
+          <a:fontRef idx="minor">
+            <a:schemeClr val="tx1"/>
+          </a:fontRef>
+        </p:style>
+      </p:cxnSp>
+      <p:cxnSp>
+        <p:nvCxnSpPr>
+          <p:cNvPr id="60" name="Connecteur droit avec flèche 59">
+            <a:extLst>
+              <a:ext uri="{FF2B5EF4-FFF2-40B4-BE49-F238E27FC236}">
+                <a16:creationId xmlns:a16="http://schemas.microsoft.com/office/drawing/2014/main" id="{2316AE3A-F2B4-49D2-9266-88C1B192C4D7}"/>
+              </a:ext>
+            </a:extLst>
+          </p:cNvPr>
+          <p:cNvCxnSpPr>
+            <a:cxnSpLocks/>
+            <a:stCxn id="50" idx="3"/>
+            <a:endCxn id="57" idx="2"/>
+          </p:cNvCxnSpPr>
+          <p:nvPr/>
+        </p:nvCxnSpPr>
+        <p:spPr>
+          <a:xfrm>
+            <a:off x="6740547" y="3154457"/>
+            <a:ext cx="660428" cy="988010"/>
+          </a:xfrm>
+          <a:prstGeom prst="straightConnector1">
+            <a:avLst/>
+          </a:prstGeom>
+          <a:ln>
+            <a:solidFill>
+              <a:schemeClr val="bg1"/>
+            </a:solidFill>
+            <a:tailEnd type="triangle"/>
+          </a:ln>
+        </p:spPr>
+        <p:style>
+          <a:lnRef idx="1">
+            <a:schemeClr val="dk1"/>
+          </a:lnRef>
+          <a:fillRef idx="0">
+            <a:schemeClr val="dk1"/>
+          </a:fillRef>
+          <a:effectRef idx="0">
+            <a:schemeClr val="dk1"/>
+          </a:effectRef>
+          <a:fontRef idx="minor">
+            <a:schemeClr val="tx1"/>
+          </a:fontRef>
+        </p:style>
+      </p:cxnSp>
+      <p:sp>
+        <p:nvSpPr>
+          <p:cNvPr id="69" name="Ellipse 68">
+            <a:extLst>
+              <a:ext uri="{FF2B5EF4-FFF2-40B4-BE49-F238E27FC236}">
+                <a16:creationId xmlns:a16="http://schemas.microsoft.com/office/drawing/2014/main" id="{23F50C11-82D6-47C6-ADE9-979D95A75819}"/>
+              </a:ext>
+            </a:extLst>
+          </p:cNvPr>
+          <p:cNvSpPr/>
+          <p:nvPr/>
+        </p:nvSpPr>
+        <p:spPr>
+          <a:xfrm>
+            <a:off x="8312073" y="2755570"/>
+            <a:ext cx="406353" cy="406353"/>
+          </a:xfrm>
+          <a:prstGeom prst="ellipse">
+            <a:avLst/>
+          </a:prstGeom>
+          <a:solidFill>
+            <a:srgbClr val="C18BC2"/>
+          </a:solidFill>
+          <a:ln w="19050">
+            <a:solidFill>
+              <a:schemeClr val="bg1"/>
+            </a:solidFill>
+          </a:ln>
+        </p:spPr>
+        <p:style>
+          <a:lnRef idx="2">
+            <a:schemeClr val="accent1">
+              <a:shade val="50000"/>
+            </a:schemeClr>
+          </a:lnRef>
+          <a:fillRef idx="1">
+            <a:schemeClr val="accent1"/>
+          </a:fillRef>
+          <a:effectRef idx="0">
+            <a:schemeClr val="accent1"/>
+          </a:effectRef>
+          <a:fontRef idx="minor">
+            <a:schemeClr val="lt1"/>
+          </a:fontRef>
+        </p:style>
+        <p:txBody>
+          <a:bodyPr rtlCol="0" anchor="ctr"/>
+          <a:lstStyle/>
+          <a:p>
+            <a:pPr algn="ctr"/>
+            <a:endParaRPr lang="en-IE" dirty="0">
+              <a:solidFill>
+                <a:schemeClr val="tx1"/>
+              </a:solidFill>
+            </a:endParaRPr>
+          </a:p>
+        </p:txBody>
+      </p:sp>
+      <p:sp>
+        <p:nvSpPr>
+          <p:cNvPr id="70" name="Ellipse 69">
+            <a:extLst>
+              <a:ext uri="{FF2B5EF4-FFF2-40B4-BE49-F238E27FC236}">
+                <a16:creationId xmlns:a16="http://schemas.microsoft.com/office/drawing/2014/main" id="{CE21ECB8-A91D-471D-8F5B-3A603CD6C08A}"/>
+              </a:ext>
+            </a:extLst>
+          </p:cNvPr>
+          <p:cNvSpPr/>
+          <p:nvPr/>
+        </p:nvSpPr>
+        <p:spPr>
+          <a:xfrm>
+            <a:off x="8318337" y="3346387"/>
+            <a:ext cx="406353" cy="406353"/>
+          </a:xfrm>
+          <a:prstGeom prst="ellipse">
+            <a:avLst/>
+          </a:prstGeom>
+          <a:solidFill>
+            <a:srgbClr val="C18BC2"/>
+          </a:solidFill>
+          <a:ln w="19050">
+            <a:solidFill>
+              <a:schemeClr val="bg1"/>
+            </a:solidFill>
+          </a:ln>
+        </p:spPr>
+        <p:style>
+          <a:lnRef idx="2">
+            <a:schemeClr val="accent1">
+              <a:shade val="50000"/>
+            </a:schemeClr>
+          </a:lnRef>
+          <a:fillRef idx="1">
+            <a:schemeClr val="accent1"/>
+          </a:fillRef>
+          <a:effectRef idx="0">
+            <a:schemeClr val="accent1"/>
+          </a:effectRef>
+          <a:fontRef idx="minor">
+            <a:schemeClr val="lt1"/>
+          </a:fontRef>
+        </p:style>
+        <p:txBody>
+          <a:bodyPr rtlCol="0" anchor="ctr"/>
+          <a:lstStyle/>
+          <a:p>
+            <a:pPr algn="ctr"/>
+            <a:endParaRPr lang="en-IE" dirty="0">
+              <a:solidFill>
+                <a:schemeClr val="tx1"/>
+              </a:solidFill>
+            </a:endParaRPr>
+          </a:p>
+        </p:txBody>
+      </p:sp>
+      <p:sp>
+        <p:nvSpPr>
+          <p:cNvPr id="71" name="Ellipse 70">
+            <a:extLst>
+              <a:ext uri="{FF2B5EF4-FFF2-40B4-BE49-F238E27FC236}">
+                <a16:creationId xmlns:a16="http://schemas.microsoft.com/office/drawing/2014/main" id="{C83AD446-0D8E-469A-AA98-76863DE14767}"/>
+              </a:ext>
+            </a:extLst>
+          </p:cNvPr>
+          <p:cNvSpPr/>
+          <p:nvPr/>
+        </p:nvSpPr>
+        <p:spPr>
+          <a:xfrm>
+            <a:off x="8312073" y="3939290"/>
+            <a:ext cx="406353" cy="406353"/>
+          </a:xfrm>
+          <a:prstGeom prst="ellipse">
+            <a:avLst/>
+          </a:prstGeom>
+          <a:solidFill>
+            <a:srgbClr val="C18BC2"/>
+          </a:solidFill>
+          <a:ln w="19050">
+            <a:solidFill>
+              <a:schemeClr val="bg1"/>
+            </a:solidFill>
+          </a:ln>
+        </p:spPr>
+        <p:style>
+          <a:lnRef idx="2">
+            <a:schemeClr val="accent1">
+              <a:shade val="50000"/>
+            </a:schemeClr>
+          </a:lnRef>
+          <a:fillRef idx="1">
+            <a:schemeClr val="accent1"/>
+          </a:fillRef>
+          <a:effectRef idx="0">
+            <a:schemeClr val="accent1"/>
+          </a:effectRef>
+          <a:fontRef idx="minor">
+            <a:schemeClr val="lt1"/>
+          </a:fontRef>
+        </p:style>
+        <p:txBody>
+          <a:bodyPr rtlCol="0" anchor="ctr"/>
+          <a:lstStyle/>
+          <a:p>
+            <a:pPr algn="ctr"/>
+            <a:endParaRPr lang="en-IE" dirty="0">
+              <a:solidFill>
+                <a:schemeClr val="tx1"/>
+              </a:solidFill>
+            </a:endParaRPr>
+          </a:p>
+        </p:txBody>
+      </p:sp>
+      <p:sp>
+        <p:nvSpPr>
+          <p:cNvPr id="72" name="ZoneTexte 71">
+            <a:extLst>
+              <a:ext uri="{FF2B5EF4-FFF2-40B4-BE49-F238E27FC236}">
+                <a16:creationId xmlns:a16="http://schemas.microsoft.com/office/drawing/2014/main" id="{CAAAC310-36D4-487A-86F1-06CC2A8BB87F}"/>
+              </a:ext>
+            </a:extLst>
+          </p:cNvPr>
+          <p:cNvSpPr txBox="1"/>
+          <p:nvPr/>
+        </p:nvSpPr>
+        <p:spPr>
+          <a:xfrm>
+            <a:off x="8797979" y="2777168"/>
+            <a:ext cx="1349087" cy="338554"/>
+          </a:xfrm>
+          <a:prstGeom prst="rect">
+            <a:avLst/>
+          </a:prstGeom>
+          <a:noFill/>
+        </p:spPr>
+        <p:txBody>
+          <a:bodyPr wrap="none" rtlCol="0">
+            <a:spAutoFit/>
+          </a:bodyPr>
+          <a:lstStyle/>
+          <a:p>
+            <a:r>
+              <a:rPr lang="en-IE" sz="1600" dirty="0">
+                <a:solidFill>
+                  <a:schemeClr val="bg1"/>
+                </a:solidFill>
+              </a:rPr>
+              <a:t>Python object</a:t>
+            </a:r>
+          </a:p>
+        </p:txBody>
+      </p:sp>
+      <p:sp>
+        <p:nvSpPr>
+          <p:cNvPr id="73" name="ZoneTexte 72">
+            <a:extLst>
+              <a:ext uri="{FF2B5EF4-FFF2-40B4-BE49-F238E27FC236}">
+                <a16:creationId xmlns:a16="http://schemas.microsoft.com/office/drawing/2014/main" id="{5E9F6866-8AF8-479A-8D2B-74909F577FC0}"/>
+              </a:ext>
+            </a:extLst>
+          </p:cNvPr>
+          <p:cNvSpPr txBox="1"/>
+          <p:nvPr/>
+        </p:nvSpPr>
+        <p:spPr>
+          <a:xfrm>
+            <a:off x="8812094" y="3265304"/>
+            <a:ext cx="1282852" cy="584775"/>
+          </a:xfrm>
+          <a:prstGeom prst="rect">
+            <a:avLst/>
+          </a:prstGeom>
+          <a:noFill/>
+        </p:spPr>
+        <p:txBody>
+          <a:bodyPr wrap="none" rtlCol="0">
+            <a:spAutoFit/>
+          </a:bodyPr>
+          <a:lstStyle/>
+          <a:p>
+            <a:r>
+              <a:rPr lang="en-IE" sz="1600" dirty="0">
+                <a:solidFill>
+                  <a:schemeClr val="bg1"/>
+                </a:solidFill>
+              </a:rPr>
+              <a:t>Netcdf4</a:t>
+            </a:r>
+          </a:p>
+          <a:p>
+            <a:r>
+              <a:rPr lang="en-IE" sz="1600" i="1" dirty="0" err="1">
+                <a:solidFill>
+                  <a:schemeClr val="bg1"/>
+                </a:solidFill>
+              </a:rPr>
+              <a:t>xarray</a:t>
+            </a:r>
+            <a:r>
+              <a:rPr lang="en-IE" sz="1600" dirty="0">
+                <a:solidFill>
+                  <a:schemeClr val="bg1"/>
+                </a:solidFill>
+              </a:rPr>
+              <a:t> object</a:t>
+            </a:r>
+          </a:p>
+        </p:txBody>
+      </p:sp>
+      <p:sp>
+        <p:nvSpPr>
+          <p:cNvPr id="74" name="ZoneTexte 73">
+            <a:extLst>
+              <a:ext uri="{FF2B5EF4-FFF2-40B4-BE49-F238E27FC236}">
+                <a16:creationId xmlns:a16="http://schemas.microsoft.com/office/drawing/2014/main" id="{04FF7BFC-1CA3-4EBF-82FC-694AD780FD38}"/>
+              </a:ext>
+            </a:extLst>
+          </p:cNvPr>
+          <p:cNvSpPr txBox="1"/>
+          <p:nvPr/>
+        </p:nvSpPr>
+        <p:spPr>
+          <a:xfrm>
+            <a:off x="8822721" y="3850079"/>
+            <a:ext cx="1396857" cy="584775"/>
+          </a:xfrm>
+          <a:prstGeom prst="rect">
+            <a:avLst/>
+          </a:prstGeom>
+          <a:noFill/>
+        </p:spPr>
+        <p:txBody>
+          <a:bodyPr wrap="none" rtlCol="0">
+            <a:spAutoFit/>
+          </a:bodyPr>
+          <a:lstStyle/>
+          <a:p>
+            <a:r>
+              <a:rPr lang="en-IE" sz="1600" dirty="0">
+                <a:solidFill>
+                  <a:schemeClr val="bg1"/>
+                </a:solidFill>
+              </a:rPr>
+              <a:t>Raster</a:t>
+            </a:r>
+            <a:br>
+              <a:rPr lang="en-IE" sz="1600" dirty="0">
+                <a:solidFill>
+                  <a:schemeClr val="bg1"/>
+                </a:solidFill>
+              </a:rPr>
+            </a:br>
+            <a:r>
+              <a:rPr lang="en-IE" sz="1600" i="1" dirty="0" err="1">
+                <a:solidFill>
+                  <a:schemeClr val="bg1"/>
+                </a:solidFill>
+              </a:rPr>
+              <a:t>rasterio</a:t>
+            </a:r>
+            <a:r>
+              <a:rPr lang="en-IE" sz="1600" dirty="0">
+                <a:solidFill>
+                  <a:schemeClr val="bg1"/>
+                </a:solidFill>
+              </a:rPr>
+              <a:t> object</a:t>
+            </a:r>
+          </a:p>
+        </p:txBody>
+      </p:sp>
+      <p:cxnSp>
+        <p:nvCxnSpPr>
+          <p:cNvPr id="75" name="Connecteur droit avec flèche 74">
+            <a:extLst>
+              <a:ext uri="{FF2B5EF4-FFF2-40B4-BE49-F238E27FC236}">
+                <a16:creationId xmlns:a16="http://schemas.microsoft.com/office/drawing/2014/main" id="{FFD7A48E-AE5E-4ACB-BF25-95D1DF3AD503}"/>
+              </a:ext>
+            </a:extLst>
+          </p:cNvPr>
+          <p:cNvCxnSpPr>
+            <a:cxnSpLocks/>
+            <a:stCxn id="54" idx="6"/>
+            <a:endCxn id="70" idx="2"/>
+          </p:cNvCxnSpPr>
+          <p:nvPr/>
+        </p:nvCxnSpPr>
+        <p:spPr>
+          <a:xfrm>
+            <a:off x="7807328" y="2958747"/>
+            <a:ext cx="511009" cy="590817"/>
+          </a:xfrm>
+          <a:prstGeom prst="straightConnector1">
+            <a:avLst/>
+          </a:prstGeom>
+          <a:ln>
+            <a:solidFill>
+              <a:schemeClr val="bg1"/>
+            </a:solidFill>
+            <a:tailEnd type="triangle"/>
+          </a:ln>
+        </p:spPr>
+        <p:style>
+          <a:lnRef idx="1">
+            <a:schemeClr val="dk1"/>
+          </a:lnRef>
+          <a:fillRef idx="0">
+            <a:schemeClr val="dk1"/>
+          </a:fillRef>
+          <a:effectRef idx="0">
+            <a:schemeClr val="dk1"/>
+          </a:effectRef>
+          <a:fontRef idx="minor">
+            <a:schemeClr val="tx1"/>
+          </a:fontRef>
+        </p:style>
+      </p:cxnSp>
+      <p:cxnSp>
+        <p:nvCxnSpPr>
+          <p:cNvPr id="78" name="Connecteur droit avec flèche 77">
+            <a:extLst>
+              <a:ext uri="{FF2B5EF4-FFF2-40B4-BE49-F238E27FC236}">
+                <a16:creationId xmlns:a16="http://schemas.microsoft.com/office/drawing/2014/main" id="{88B6505C-30D6-478F-B611-282E1CDDD78F}"/>
+              </a:ext>
+            </a:extLst>
+          </p:cNvPr>
+          <p:cNvCxnSpPr>
+            <a:cxnSpLocks/>
+            <a:stCxn id="54" idx="6"/>
+            <a:endCxn id="71" idx="2"/>
+          </p:cNvCxnSpPr>
+          <p:nvPr/>
+        </p:nvCxnSpPr>
+        <p:spPr>
+          <a:xfrm>
+            <a:off x="7807328" y="2958747"/>
+            <a:ext cx="504745" cy="1183720"/>
+          </a:xfrm>
+          <a:prstGeom prst="straightConnector1">
+            <a:avLst/>
+          </a:prstGeom>
+          <a:ln>
+            <a:solidFill>
+              <a:schemeClr val="bg1"/>
+            </a:solidFill>
+            <a:tailEnd type="triangle"/>
+          </a:ln>
+        </p:spPr>
+        <p:style>
+          <a:lnRef idx="1">
+            <a:schemeClr val="dk1"/>
+          </a:lnRef>
+          <a:fillRef idx="0">
+            <a:schemeClr val="dk1"/>
+          </a:fillRef>
+          <a:effectRef idx="0">
+            <a:schemeClr val="dk1"/>
+          </a:effectRef>
+          <a:fontRef idx="minor">
+            <a:schemeClr val="tx1"/>
+          </a:fontRef>
+        </p:style>
+      </p:cxnSp>
+      <p:cxnSp>
+        <p:nvCxnSpPr>
+          <p:cNvPr id="81" name="Connecteur droit avec flèche 80">
+            <a:extLst>
+              <a:ext uri="{FF2B5EF4-FFF2-40B4-BE49-F238E27FC236}">
+                <a16:creationId xmlns:a16="http://schemas.microsoft.com/office/drawing/2014/main" id="{937641A3-C6B1-415C-A4DC-B84126F1ABA1}"/>
+              </a:ext>
+            </a:extLst>
+          </p:cNvPr>
+          <p:cNvCxnSpPr>
+            <a:cxnSpLocks/>
+            <a:stCxn id="54" idx="6"/>
+            <a:endCxn id="69" idx="2"/>
+          </p:cNvCxnSpPr>
+          <p:nvPr/>
+        </p:nvCxnSpPr>
+        <p:spPr>
+          <a:xfrm>
+            <a:off x="7807328" y="2958747"/>
+            <a:ext cx="504745" cy="0"/>
+          </a:xfrm>
+          <a:prstGeom prst="straightConnector1">
+            <a:avLst/>
+          </a:prstGeom>
+          <a:ln>
+            <a:solidFill>
+              <a:schemeClr val="bg1"/>
+            </a:solidFill>
+            <a:tailEnd type="triangle"/>
+          </a:ln>
+        </p:spPr>
+        <p:style>
+          <a:lnRef idx="1">
+            <a:schemeClr val="dk1"/>
+          </a:lnRef>
+          <a:fillRef idx="0">
+            <a:schemeClr val="dk1"/>
+          </a:fillRef>
+          <a:effectRef idx="0">
+            <a:schemeClr val="dk1"/>
+          </a:effectRef>
+          <a:fontRef idx="minor">
+            <a:schemeClr val="tx1"/>
+          </a:fontRef>
+        </p:style>
+      </p:cxnSp>
+      <p:cxnSp>
+        <p:nvCxnSpPr>
+          <p:cNvPr id="84" name="Connecteur droit avec flèche 83">
+            <a:extLst>
+              <a:ext uri="{FF2B5EF4-FFF2-40B4-BE49-F238E27FC236}">
+                <a16:creationId xmlns:a16="http://schemas.microsoft.com/office/drawing/2014/main" id="{65E6C97E-F052-4F3E-B70E-364BE495EC95}"/>
+              </a:ext>
+            </a:extLst>
+          </p:cNvPr>
+          <p:cNvCxnSpPr>
+            <a:cxnSpLocks/>
+            <a:stCxn id="56" idx="6"/>
+            <a:endCxn id="69" idx="2"/>
+          </p:cNvCxnSpPr>
+          <p:nvPr/>
+        </p:nvCxnSpPr>
+        <p:spPr>
+          <a:xfrm flipV="1">
+            <a:off x="7813592" y="2958747"/>
+            <a:ext cx="498481" cy="590817"/>
+          </a:xfrm>
+          <a:prstGeom prst="straightConnector1">
+            <a:avLst/>
+          </a:prstGeom>
+          <a:ln>
+            <a:solidFill>
+              <a:schemeClr val="bg1"/>
+            </a:solidFill>
+            <a:tailEnd type="triangle"/>
+          </a:ln>
+        </p:spPr>
+        <p:style>
+          <a:lnRef idx="1">
+            <a:schemeClr val="dk1"/>
+          </a:lnRef>
+          <a:fillRef idx="0">
+            <a:schemeClr val="dk1"/>
+          </a:fillRef>
+          <a:effectRef idx="0">
+            <a:schemeClr val="dk1"/>
+          </a:effectRef>
+          <a:fontRef idx="minor">
+            <a:schemeClr val="tx1"/>
+          </a:fontRef>
+        </p:style>
+      </p:cxnSp>
+      <p:cxnSp>
+        <p:nvCxnSpPr>
+          <p:cNvPr id="87" name="Connecteur droit avec flèche 86">
+            <a:extLst>
+              <a:ext uri="{FF2B5EF4-FFF2-40B4-BE49-F238E27FC236}">
+                <a16:creationId xmlns:a16="http://schemas.microsoft.com/office/drawing/2014/main" id="{84608388-70F5-418E-86D2-31238C19DBDD}"/>
+              </a:ext>
+            </a:extLst>
+          </p:cNvPr>
+          <p:cNvCxnSpPr>
+            <a:cxnSpLocks/>
+            <a:stCxn id="57" idx="6"/>
+            <a:endCxn id="69" idx="2"/>
+          </p:cNvCxnSpPr>
+          <p:nvPr/>
+        </p:nvCxnSpPr>
+        <p:spPr>
+          <a:xfrm flipV="1">
+            <a:off x="7807328" y="2958747"/>
+            <a:ext cx="504745" cy="1183720"/>
+          </a:xfrm>
+          <a:prstGeom prst="straightConnector1">
+            <a:avLst/>
+          </a:prstGeom>
+          <a:ln>
+            <a:solidFill>
+              <a:schemeClr val="bg1"/>
+            </a:solidFill>
+            <a:tailEnd type="triangle"/>
+          </a:ln>
+        </p:spPr>
+        <p:style>
+          <a:lnRef idx="1">
+            <a:schemeClr val="dk1"/>
+          </a:lnRef>
+          <a:fillRef idx="0">
+            <a:schemeClr val="dk1"/>
+          </a:fillRef>
+          <a:effectRef idx="0">
+            <a:schemeClr val="dk1"/>
+          </a:effectRef>
+          <a:fontRef idx="minor">
+            <a:schemeClr val="tx1"/>
+          </a:fontRef>
+        </p:style>
+      </p:cxnSp>
+      <p:cxnSp>
+        <p:nvCxnSpPr>
+          <p:cNvPr id="90" name="Connecteur droit avec flèche 89">
+            <a:extLst>
+              <a:ext uri="{FF2B5EF4-FFF2-40B4-BE49-F238E27FC236}">
+                <a16:creationId xmlns:a16="http://schemas.microsoft.com/office/drawing/2014/main" id="{9D09BD36-FAE1-42B3-B268-875C8FEC5DE0}"/>
+              </a:ext>
+            </a:extLst>
+          </p:cNvPr>
+          <p:cNvCxnSpPr>
+            <a:cxnSpLocks/>
+            <a:stCxn id="56" idx="6"/>
+            <a:endCxn id="70" idx="2"/>
+          </p:cNvCxnSpPr>
+          <p:nvPr/>
+        </p:nvCxnSpPr>
+        <p:spPr>
+          <a:xfrm>
+            <a:off x="7813592" y="3549564"/>
+            <a:ext cx="504745" cy="0"/>
+          </a:xfrm>
+          <a:prstGeom prst="straightConnector1">
+            <a:avLst/>
+          </a:prstGeom>
+          <a:ln>
+            <a:solidFill>
+              <a:schemeClr val="bg1"/>
+            </a:solidFill>
+            <a:tailEnd type="triangle"/>
+          </a:ln>
+        </p:spPr>
+        <p:style>
+          <a:lnRef idx="1">
+            <a:schemeClr val="dk1"/>
+          </a:lnRef>
+          <a:fillRef idx="0">
+            <a:schemeClr val="dk1"/>
+          </a:fillRef>
+          <a:effectRef idx="0">
+            <a:schemeClr val="dk1"/>
+          </a:effectRef>
+          <a:fontRef idx="minor">
+            <a:schemeClr val="tx1"/>
+          </a:fontRef>
+        </p:style>
+      </p:cxnSp>
+      <p:cxnSp>
+        <p:nvCxnSpPr>
+          <p:cNvPr id="94" name="Connecteur droit avec flèche 93">
+            <a:extLst>
+              <a:ext uri="{FF2B5EF4-FFF2-40B4-BE49-F238E27FC236}">
+                <a16:creationId xmlns:a16="http://schemas.microsoft.com/office/drawing/2014/main" id="{41965EC6-E7D7-4686-B269-352E5A6CCBD1}"/>
+              </a:ext>
+            </a:extLst>
+          </p:cNvPr>
+          <p:cNvCxnSpPr>
+            <a:cxnSpLocks/>
+            <a:stCxn id="56" idx="6"/>
+            <a:endCxn id="71" idx="2"/>
+          </p:cNvCxnSpPr>
+          <p:nvPr/>
+        </p:nvCxnSpPr>
+        <p:spPr>
+          <a:xfrm>
+            <a:off x="7813592" y="3549564"/>
+            <a:ext cx="498481" cy="592903"/>
+          </a:xfrm>
+          <a:prstGeom prst="straightConnector1">
+            <a:avLst/>
+          </a:prstGeom>
+          <a:ln>
+            <a:solidFill>
+              <a:schemeClr val="bg1"/>
+            </a:solidFill>
+            <a:tailEnd type="triangle"/>
+          </a:ln>
+        </p:spPr>
+        <p:style>
+          <a:lnRef idx="1">
+            <a:schemeClr val="dk1"/>
+          </a:lnRef>
+          <a:fillRef idx="0">
+            <a:schemeClr val="dk1"/>
+          </a:fillRef>
+          <a:effectRef idx="0">
+            <a:schemeClr val="dk1"/>
+          </a:effectRef>
+          <a:fontRef idx="minor">
+            <a:schemeClr val="tx1"/>
+          </a:fontRef>
+        </p:style>
+      </p:cxnSp>
+      <p:cxnSp>
+        <p:nvCxnSpPr>
+          <p:cNvPr id="97" name="Connecteur droit avec flèche 96">
+            <a:extLst>
+              <a:ext uri="{FF2B5EF4-FFF2-40B4-BE49-F238E27FC236}">
+                <a16:creationId xmlns:a16="http://schemas.microsoft.com/office/drawing/2014/main" id="{F8B6366B-1375-424F-BB4F-931B311D5CBA}"/>
+              </a:ext>
+            </a:extLst>
+          </p:cNvPr>
+          <p:cNvCxnSpPr>
+            <a:cxnSpLocks/>
+            <a:stCxn id="57" idx="6"/>
+            <a:endCxn id="70" idx="2"/>
+          </p:cNvCxnSpPr>
+          <p:nvPr/>
+        </p:nvCxnSpPr>
+        <p:spPr>
+          <a:xfrm flipV="1">
+            <a:off x="7807328" y="3549564"/>
+            <a:ext cx="511009" cy="592903"/>
+          </a:xfrm>
+          <a:prstGeom prst="straightConnector1">
+            <a:avLst/>
+          </a:prstGeom>
+          <a:ln>
+            <a:solidFill>
+              <a:schemeClr val="bg1"/>
+            </a:solidFill>
+            <a:tailEnd type="triangle"/>
+          </a:ln>
+        </p:spPr>
+        <p:style>
+          <a:lnRef idx="1">
+            <a:schemeClr val="dk1"/>
+          </a:lnRef>
+          <a:fillRef idx="0">
+            <a:schemeClr val="dk1"/>
+          </a:fillRef>
+          <a:effectRef idx="0">
+            <a:schemeClr val="dk1"/>
+          </a:effectRef>
+          <a:fontRef idx="minor">
+            <a:schemeClr val="tx1"/>
+          </a:fontRef>
+        </p:style>
+      </p:cxnSp>
+      <p:cxnSp>
+        <p:nvCxnSpPr>
+          <p:cNvPr id="100" name="Connecteur droit avec flèche 99">
+            <a:extLst>
+              <a:ext uri="{FF2B5EF4-FFF2-40B4-BE49-F238E27FC236}">
+                <a16:creationId xmlns:a16="http://schemas.microsoft.com/office/drawing/2014/main" id="{D7A151F1-9807-4CB0-BF8D-CF9A2FD134EA}"/>
+              </a:ext>
+            </a:extLst>
+          </p:cNvPr>
+          <p:cNvCxnSpPr>
+            <a:cxnSpLocks/>
+            <a:stCxn id="57" idx="6"/>
+            <a:endCxn id="71" idx="2"/>
+          </p:cNvCxnSpPr>
+          <p:nvPr/>
+        </p:nvCxnSpPr>
+        <p:spPr>
+          <a:xfrm>
+            <a:off x="7807328" y="4142467"/>
+            <a:ext cx="504745" cy="0"/>
+          </a:xfrm>
+          <a:prstGeom prst="straightConnector1">
+            <a:avLst/>
+          </a:prstGeom>
+          <a:ln>
+            <a:solidFill>
+              <a:schemeClr val="bg1"/>
+            </a:solidFill>
+            <a:tailEnd type="triangle"/>
+          </a:ln>
+        </p:spPr>
+        <p:style>
+          <a:lnRef idx="1">
+            <a:schemeClr val="dk1"/>
+          </a:lnRef>
+          <a:fillRef idx="0">
+            <a:schemeClr val="dk1"/>
+          </a:fillRef>
+          <a:effectRef idx="0">
+            <a:schemeClr val="dk1"/>
+          </a:effectRef>
+          <a:fontRef idx="minor">
+            <a:schemeClr val="tx1"/>
+          </a:fontRef>
+        </p:style>
+      </p:cxnSp>
+      <p:sp>
+        <p:nvSpPr>
+          <p:cNvPr id="136" name="Rectangle 135">
+            <a:extLst>
+              <a:ext uri="{FF2B5EF4-FFF2-40B4-BE49-F238E27FC236}">
+                <a16:creationId xmlns:a16="http://schemas.microsoft.com/office/drawing/2014/main" id="{792863AA-2984-41DF-80BB-E2D32C1F686D}"/>
+              </a:ext>
+            </a:extLst>
+          </p:cNvPr>
+          <p:cNvSpPr/>
+          <p:nvPr/>
+        </p:nvSpPr>
+        <p:spPr>
+          <a:xfrm>
+            <a:off x="7454345" y="2391593"/>
+            <a:ext cx="1183273" cy="369332"/>
+          </a:xfrm>
+          <a:prstGeom prst="rect">
+            <a:avLst/>
+          </a:prstGeom>
+        </p:spPr>
+        <p:txBody>
+          <a:bodyPr wrap="none">
+            <a:spAutoFit/>
+          </a:bodyPr>
+          <a:lstStyle/>
+          <a:p>
+            <a:pPr algn="ctr"/>
+            <a:r>
+              <a:rPr lang="en-IE" dirty="0">
+                <a:solidFill>
+                  <a:schemeClr val="bg1"/>
+                </a:solidFill>
+              </a:rPr>
+              <a:t>outputting</a:t>
+            </a:r>
+          </a:p>
+        </p:txBody>
+      </p:sp>
+      <p:sp>
+        <p:nvSpPr>
+          <p:cNvPr id="193" name="Ellipse 192">
+            <a:extLst>
+              <a:ext uri="{FF2B5EF4-FFF2-40B4-BE49-F238E27FC236}">
+                <a16:creationId xmlns:a16="http://schemas.microsoft.com/office/drawing/2014/main" id="{17D75915-A7C2-4C3B-87A9-9481E684AC8E}"/>
+              </a:ext>
+            </a:extLst>
+          </p:cNvPr>
+          <p:cNvSpPr/>
+          <p:nvPr/>
+        </p:nvSpPr>
+        <p:spPr>
+          <a:xfrm>
+            <a:off x="10219578" y="3362925"/>
+            <a:ext cx="406353" cy="406353"/>
+          </a:xfrm>
+          <a:prstGeom prst="ellipse">
+            <a:avLst/>
+          </a:prstGeom>
+          <a:solidFill>
+            <a:srgbClr val="C18BC2"/>
+          </a:solidFill>
+          <a:ln w="19050">
+            <a:solidFill>
+              <a:schemeClr val="bg1"/>
+            </a:solidFill>
+          </a:ln>
+        </p:spPr>
+        <p:style>
+          <a:lnRef idx="2">
+            <a:schemeClr val="accent1">
+              <a:shade val="50000"/>
+            </a:schemeClr>
+          </a:lnRef>
+          <a:fillRef idx="1">
+            <a:schemeClr val="accent1"/>
+          </a:fillRef>
+          <a:effectRef idx="0">
+            <a:schemeClr val="accent1"/>
+          </a:effectRef>
+          <a:fontRef idx="minor">
+            <a:schemeClr val="lt1"/>
+          </a:fontRef>
+        </p:style>
+        <p:txBody>
+          <a:bodyPr rtlCol="0" anchor="ctr"/>
+          <a:lstStyle/>
+          <a:p>
+            <a:pPr algn="ctr"/>
+            <a:endParaRPr lang="en-IE" dirty="0">
+              <a:solidFill>
+                <a:schemeClr val="tx1"/>
+              </a:solidFill>
+            </a:endParaRPr>
+          </a:p>
+        </p:txBody>
+      </p:sp>
+      <p:cxnSp>
+        <p:nvCxnSpPr>
+          <p:cNvPr id="194" name="Connecteur droit avec flèche 193">
+            <a:extLst>
+              <a:ext uri="{FF2B5EF4-FFF2-40B4-BE49-F238E27FC236}">
+                <a16:creationId xmlns:a16="http://schemas.microsoft.com/office/drawing/2014/main" id="{BBB76E3A-4974-4BB9-BFF6-FCF77AB68C1C}"/>
+              </a:ext>
+            </a:extLst>
+          </p:cNvPr>
+          <p:cNvCxnSpPr>
+            <a:cxnSpLocks/>
+            <a:stCxn id="70" idx="6"/>
+            <a:endCxn id="193" idx="2"/>
+          </p:cNvCxnSpPr>
+          <p:nvPr/>
+        </p:nvCxnSpPr>
+        <p:spPr>
+          <a:xfrm>
+            <a:off x="8724690" y="3549564"/>
+            <a:ext cx="1494888" cy="16538"/>
+          </a:xfrm>
+          <a:prstGeom prst="straightConnector1">
+            <a:avLst/>
+          </a:prstGeom>
+          <a:ln>
+            <a:solidFill>
+              <a:schemeClr val="bg1"/>
+            </a:solidFill>
+            <a:tailEnd type="triangle"/>
+          </a:ln>
+        </p:spPr>
+        <p:style>
+          <a:lnRef idx="1">
+            <a:schemeClr val="dk1"/>
+          </a:lnRef>
+          <a:fillRef idx="0">
+            <a:schemeClr val="dk1"/>
+          </a:fillRef>
+          <a:effectRef idx="0">
+            <a:schemeClr val="dk1"/>
+          </a:effectRef>
+          <a:fontRef idx="minor">
+            <a:schemeClr val="tx1"/>
+          </a:fontRef>
+        </p:style>
+      </p:cxnSp>
+      <p:sp>
+        <p:nvSpPr>
+          <p:cNvPr id="199" name="ZoneTexte 198">
+            <a:extLst>
+              <a:ext uri="{FF2B5EF4-FFF2-40B4-BE49-F238E27FC236}">
+                <a16:creationId xmlns:a16="http://schemas.microsoft.com/office/drawing/2014/main" id="{99C99720-759B-46F1-B7BE-6643330B1EAE}"/>
+              </a:ext>
+            </a:extLst>
+          </p:cNvPr>
+          <p:cNvSpPr txBox="1"/>
+          <p:nvPr/>
+        </p:nvSpPr>
+        <p:spPr>
+          <a:xfrm>
+            <a:off x="10207791" y="3380286"/>
+            <a:ext cx="429926" cy="338554"/>
+          </a:xfrm>
+          <a:prstGeom prst="rect">
+            <a:avLst/>
+          </a:prstGeom>
+          <a:noFill/>
+          <a:ln>
+            <a:noFill/>
+          </a:ln>
+        </p:spPr>
+        <p:txBody>
+          <a:bodyPr wrap="none" rtlCol="0">
+            <a:spAutoFit/>
+          </a:bodyPr>
+          <a:lstStyle/>
+          <a:p>
+            <a:r>
+              <a:rPr lang="en-IE" sz="1600" dirty="0">
+                <a:solidFill>
+                  <a:schemeClr val="bg1"/>
+                </a:solidFill>
+              </a:rPr>
+              <a:t>.</a:t>
+            </a:r>
+            <a:r>
+              <a:rPr lang="en-IE" sz="1600" dirty="0" err="1">
+                <a:solidFill>
+                  <a:schemeClr val="bg1"/>
+                </a:solidFill>
+              </a:rPr>
+              <a:t>nc</a:t>
+            </a:r>
+            <a:endParaRPr lang="en-IE" sz="1600" dirty="0">
+              <a:solidFill>
+                <a:schemeClr val="bg1"/>
+              </a:solidFill>
+            </a:endParaRPr>
+          </a:p>
+        </p:txBody>
+      </p:sp>
+      <p:sp>
+        <p:nvSpPr>
+          <p:cNvPr id="200" name="Ellipse 199">
+            <a:extLst>
+              <a:ext uri="{FF2B5EF4-FFF2-40B4-BE49-F238E27FC236}">
+                <a16:creationId xmlns:a16="http://schemas.microsoft.com/office/drawing/2014/main" id="{B11A69C5-1DFC-4FE0-A40D-97FD92599609}"/>
+              </a:ext>
+            </a:extLst>
+          </p:cNvPr>
+          <p:cNvSpPr/>
+          <p:nvPr/>
+        </p:nvSpPr>
+        <p:spPr>
+          <a:xfrm>
+            <a:off x="10207791" y="3938556"/>
+            <a:ext cx="406353" cy="406353"/>
+          </a:xfrm>
+          <a:prstGeom prst="ellipse">
+            <a:avLst/>
+          </a:prstGeom>
+          <a:solidFill>
+            <a:srgbClr val="C18BC2"/>
+          </a:solidFill>
+          <a:ln w="19050">
+            <a:solidFill>
+              <a:schemeClr val="bg1"/>
+            </a:solidFill>
+          </a:ln>
+        </p:spPr>
+        <p:style>
+          <a:lnRef idx="2">
+            <a:schemeClr val="accent1">
+              <a:shade val="50000"/>
+            </a:schemeClr>
+          </a:lnRef>
+          <a:fillRef idx="1">
+            <a:schemeClr val="accent1"/>
+          </a:fillRef>
+          <a:effectRef idx="0">
+            <a:schemeClr val="accent1"/>
+          </a:effectRef>
+          <a:fontRef idx="minor">
+            <a:schemeClr val="lt1"/>
+          </a:fontRef>
+        </p:style>
+        <p:txBody>
+          <a:bodyPr rtlCol="0" anchor="ctr"/>
+          <a:lstStyle/>
+          <a:p>
+            <a:pPr algn="ctr"/>
+            <a:endParaRPr lang="en-IE" dirty="0">
+              <a:solidFill>
+                <a:schemeClr val="tx1"/>
+              </a:solidFill>
+            </a:endParaRPr>
+          </a:p>
+        </p:txBody>
+      </p:sp>
+      <p:cxnSp>
+        <p:nvCxnSpPr>
+          <p:cNvPr id="201" name="Connecteur droit avec flèche 200">
+            <a:extLst>
+              <a:ext uri="{FF2B5EF4-FFF2-40B4-BE49-F238E27FC236}">
+                <a16:creationId xmlns:a16="http://schemas.microsoft.com/office/drawing/2014/main" id="{622E3592-D60B-4E20-80DF-2B8E07AE47D7}"/>
+              </a:ext>
+            </a:extLst>
+          </p:cNvPr>
+          <p:cNvCxnSpPr>
+            <a:cxnSpLocks/>
+            <a:stCxn id="71" idx="6"/>
+            <a:endCxn id="200" idx="2"/>
+          </p:cNvCxnSpPr>
+          <p:nvPr/>
+        </p:nvCxnSpPr>
+        <p:spPr>
+          <a:xfrm flipV="1">
+            <a:off x="8718426" y="4141733"/>
+            <a:ext cx="1489365" cy="734"/>
+          </a:xfrm>
+          <a:prstGeom prst="straightConnector1">
+            <a:avLst/>
+          </a:prstGeom>
+          <a:ln>
+            <a:solidFill>
+              <a:schemeClr val="bg1"/>
+            </a:solidFill>
+            <a:tailEnd type="triangle"/>
+          </a:ln>
+        </p:spPr>
+        <p:style>
+          <a:lnRef idx="1">
+            <a:schemeClr val="dk1"/>
+          </a:lnRef>
+          <a:fillRef idx="0">
+            <a:schemeClr val="dk1"/>
+          </a:fillRef>
+          <a:effectRef idx="0">
+            <a:schemeClr val="dk1"/>
+          </a:effectRef>
+          <a:fontRef idx="minor">
+            <a:schemeClr val="tx1"/>
+          </a:fontRef>
+        </p:style>
+      </p:cxnSp>
+      <p:sp>
+        <p:nvSpPr>
+          <p:cNvPr id="205" name="ZoneTexte 204">
+            <a:extLst>
+              <a:ext uri="{FF2B5EF4-FFF2-40B4-BE49-F238E27FC236}">
+                <a16:creationId xmlns:a16="http://schemas.microsoft.com/office/drawing/2014/main" id="{CDA2CAC2-0161-44F5-B72C-ADD44187440E}"/>
+              </a:ext>
+            </a:extLst>
+          </p:cNvPr>
+          <p:cNvSpPr txBox="1"/>
+          <p:nvPr/>
+        </p:nvSpPr>
+        <p:spPr>
+          <a:xfrm>
+            <a:off x="10207791" y="3971815"/>
+            <a:ext cx="409471" cy="338554"/>
+          </a:xfrm>
+          <a:prstGeom prst="rect">
+            <a:avLst/>
+          </a:prstGeom>
+          <a:noFill/>
+          <a:ln>
+            <a:noFill/>
+          </a:ln>
+        </p:spPr>
+        <p:txBody>
+          <a:bodyPr wrap="none" rtlCol="0">
+            <a:spAutoFit/>
+          </a:bodyPr>
+          <a:lstStyle/>
+          <a:p>
+            <a:r>
+              <a:rPr lang="en-IE" sz="1600" dirty="0">
+                <a:solidFill>
+                  <a:schemeClr val="bg1"/>
+                </a:solidFill>
+              </a:rPr>
+              <a:t>.</a:t>
+            </a:r>
+            <a:r>
+              <a:rPr lang="en-IE" sz="1600" dirty="0" err="1">
+                <a:solidFill>
+                  <a:schemeClr val="bg1"/>
+                </a:solidFill>
+              </a:rPr>
+              <a:t>tif</a:t>
+            </a:r>
+            <a:endParaRPr lang="en-IE" sz="1600" dirty="0">
+              <a:solidFill>
+                <a:schemeClr val="bg1"/>
+              </a:solidFill>
+            </a:endParaRPr>
+          </a:p>
+        </p:txBody>
+      </p:sp>
+      <p:sp>
+        <p:nvSpPr>
+          <p:cNvPr id="207" name="Rectangle 206">
+            <a:extLst>
+              <a:ext uri="{FF2B5EF4-FFF2-40B4-BE49-F238E27FC236}">
+                <a16:creationId xmlns:a16="http://schemas.microsoft.com/office/drawing/2014/main" id="{5F668458-3B43-4349-B43B-F1322743DDBE}"/>
+              </a:ext>
+            </a:extLst>
+          </p:cNvPr>
+          <p:cNvSpPr/>
+          <p:nvPr/>
+        </p:nvSpPr>
+        <p:spPr>
+          <a:xfrm>
+            <a:off x="10026406" y="2433344"/>
+            <a:ext cx="769121" cy="369332"/>
+          </a:xfrm>
+          <a:prstGeom prst="rect">
+            <a:avLst/>
+          </a:prstGeom>
+        </p:spPr>
+        <p:txBody>
+          <a:bodyPr wrap="none">
+            <a:spAutoFit/>
+          </a:bodyPr>
+          <a:lstStyle/>
+          <a:p>
+            <a:pPr algn="ctr"/>
+            <a:r>
+              <a:rPr lang="en-IE" dirty="0">
+                <a:solidFill>
+                  <a:schemeClr val="bg1"/>
+                </a:solidFill>
+              </a:rPr>
+              <a:t>saving</a:t>
+            </a:r>
+          </a:p>
+        </p:txBody>
+      </p:sp>
+      <p:sp>
+        <p:nvSpPr>
+          <p:cNvPr id="52" name="ZoneTexte 51">
+            <a:extLst>
+              <a:ext uri="{FF2B5EF4-FFF2-40B4-BE49-F238E27FC236}">
+                <a16:creationId xmlns:a16="http://schemas.microsoft.com/office/drawing/2014/main" id="{9DA674BD-0C31-4AFB-9811-392DF1FCB028}"/>
+              </a:ext>
+            </a:extLst>
+          </p:cNvPr>
+          <p:cNvSpPr txBox="1"/>
+          <p:nvPr/>
+        </p:nvSpPr>
+        <p:spPr>
+          <a:xfrm>
+            <a:off x="4401672" y="3429000"/>
+            <a:ext cx="1823896" cy="307777"/>
+          </a:xfrm>
+          <a:prstGeom prst="rect">
+            <a:avLst/>
+          </a:prstGeom>
+          <a:noFill/>
+        </p:spPr>
+        <p:txBody>
+          <a:bodyPr wrap="none" rtlCol="0">
+            <a:spAutoFit/>
+          </a:bodyPr>
+          <a:lstStyle/>
+          <a:p>
+            <a:pPr algn="ctr"/>
+            <a:r>
+              <a:rPr lang="en-IE" sz="1400" dirty="0">
+                <a:solidFill>
+                  <a:schemeClr val="bg1"/>
+                </a:solidFill>
+              </a:rPr>
+              <a:t>e.g.: Kljun et al. (2015)</a:t>
+            </a:r>
+          </a:p>
+        </p:txBody>
+      </p:sp>
+    </p:spTree>
+    <p:extLst>
+      <p:ext uri="{BB962C8B-B14F-4D97-AF65-F5344CB8AC3E}">
+        <p14:creationId xmlns:p14="http://schemas.microsoft.com/office/powerpoint/2010/main" val="1095214463"/>
+      </p:ext>
+    </p:extLst>
+  </p:cSld>
+  <p:clrMapOvr>
+    <a:masterClrMapping/>
+  </p:clrMapOvr>
+</p:sld>
+</file>
+
 <file path=ppt/theme/theme1.xml><?xml version="1.0" encoding="utf-8"?>
 <a:theme xmlns:a="http://schemas.openxmlformats.org/drawingml/2006/main" name="Thème Office">
   <a:themeElements>

</xml_diff>